<commit_message>
Update pdf and pptx files of the geniv2 manual and tutorial
</commit_message>
<xml_diff>
--- a/doc/of_geni_tutorial.pptx
+++ b/doc/of_geni_tutorial.pptx
@@ -5,10 +5,10 @@
     <p:sldMasterId id="2147483648" r:id="rId1"/>
   </p:sldMasterIdLst>
   <p:notesMasterIdLst>
-    <p:notesMasterId r:id="rId37"/>
+    <p:notesMasterId r:id="rId39"/>
   </p:notesMasterIdLst>
   <p:handoutMasterIdLst>
-    <p:handoutMasterId r:id="rId38"/>
+    <p:handoutMasterId r:id="rId40"/>
   </p:handoutMasterIdLst>
   <p:sldIdLst>
     <p:sldId id="256" r:id="rId2"/>
@@ -46,6 +46,8 @@
     <p:sldId id="302" r:id="rId34"/>
     <p:sldId id="316" r:id="rId35"/>
     <p:sldId id="317" r:id="rId36"/>
+    <p:sldId id="319" r:id="rId37"/>
+    <p:sldId id="318" r:id="rId38"/>
   </p:sldIdLst>
   <p:sldSz cx="9144000" cy="6858000" type="screen4x3"/>
   <p:notesSz cx="6794500" cy="9931400"/>
@@ -237,7 +239,7 @@
             <a:fld id="{535B0D8C-BAC3-4651-A216-1B24C0686248}" type="datetimeFigureOut">
               <a:rPr lang="nl-BE" smtClean="0"/>
               <a:pPr/>
-              <a:t>3/12/2014</a:t>
+              <a:t>4/12/2014</a:t>
             </a:fld>
             <a:endParaRPr lang="nl-BE"/>
           </a:p>
@@ -404,7 +406,7 @@
             <a:fld id="{1ECBB865-E122-4B64-A9F5-1B1665068D14}" type="datetimeFigureOut">
               <a:rPr lang="nl-BE" smtClean="0"/>
               <a:pPr/>
-              <a:t>3/12/2014</a:t>
+              <a:t>4/12/2014</a:t>
             </a:fld>
             <a:endParaRPr lang="nl-BE"/>
           </a:p>
@@ -11953,7 +11955,6 @@
               <a:rPr lang="en-GB" dirty="0" smtClean="0"/>
               <a:t>vtam_request_i2cat</a:t>
             </a:r>
-            <a:endParaRPr lang="en-GB" dirty="0" smtClean="0"/>
           </a:p>
           <a:p>
             <a:pPr lvl="2"/>
@@ -20551,6 +20552,509 @@
     <p:extLst>
       <p:ext uri="{BB962C8B-B14F-4D97-AF65-F5344CB8AC3E}">
         <p14:creationId xmlns:p14="http://schemas.microsoft.com/office/powerpoint/2010/main" val="1467410610"/>
+      </p:ext>
+    </p:extLst>
+  </p:cSld>
+  <p:clrMapOvr>
+    <a:masterClrMapping/>
+  </p:clrMapOvr>
+</p:sld>
+</file>
+
+<file path=ppt/slides/slide36.xml><?xml version="1.0" encoding="utf-8"?>
+<p:sld xmlns:a="http://schemas.openxmlformats.org/drawingml/2006/main" xmlns:r="http://schemas.openxmlformats.org/officeDocument/2006/relationships" xmlns:p="http://schemas.openxmlformats.org/presentationml/2006/main">
+  <p:cSld>
+    <p:spTree>
+      <p:nvGrpSpPr>
+        <p:cNvPr id="1" name=""/>
+        <p:cNvGrpSpPr/>
+        <p:nvPr/>
+      </p:nvGrpSpPr>
+      <p:grpSpPr>
+        <a:xfrm>
+          <a:off x="0" y="0"/>
+          <a:ext cx="0" cy="0"/>
+          <a:chOff x="0" y="0"/>
+          <a:chExt cx="0" cy="0"/>
+        </a:xfrm>
+      </p:grpSpPr>
+      <p:sp>
+        <p:nvSpPr>
+          <p:cNvPr id="2" name="Títol 1"/>
+          <p:cNvSpPr>
+            <a:spLocks noGrp="1"/>
+          </p:cNvSpPr>
+          <p:nvPr>
+            <p:ph type="title"/>
+          </p:nvPr>
+        </p:nvSpPr>
+        <p:spPr/>
+        <p:txBody>
+          <a:bodyPr>
+            <a:normAutofit fontScale="90000"/>
+          </a:bodyPr>
+          <a:lstStyle/>
+          <a:p>
+            <a:r>
+              <a:rPr lang="en-US" dirty="0" smtClean="0"/>
+              <a:t>Request Resources from VTAM (GeniV3)</a:t>
+            </a:r>
+            <a:endParaRPr lang="en-US" dirty="0"/>
+          </a:p>
+        </p:txBody>
+      </p:sp>
+      <p:sp>
+        <p:nvSpPr>
+          <p:cNvPr id="3" name="Contenidor de contingut 2"/>
+          <p:cNvSpPr>
+            <a:spLocks noGrp="1"/>
+          </p:cNvSpPr>
+          <p:nvPr>
+            <p:ph idx="1"/>
+          </p:nvPr>
+        </p:nvSpPr>
+        <p:spPr/>
+        <p:txBody>
+          <a:bodyPr>
+            <a:normAutofit fontScale="85000" lnSpcReduction="10000"/>
+          </a:bodyPr>
+          <a:lstStyle/>
+          <a:p>
+            <a:pPr marL="265176" lvl="1" indent="-265176">
+              <a:buSzPct val="80000"/>
+              <a:buFont typeface="Wingdings 2"/>
+              <a:buChar char=""/>
+            </a:pPr>
+            <a:r>
+              <a:rPr lang="en-US" sz="2500" dirty="0"/>
+              <a:t>Allocate it First!</a:t>
+            </a:r>
+          </a:p>
+          <a:p>
+            <a:pPr marL="502920" lvl="2" indent="-265176">
+              <a:buSzPct val="80000"/>
+              <a:buFont typeface="Wingdings 2"/>
+              <a:buChar char=""/>
+            </a:pPr>
+            <a:r>
+              <a:rPr lang="en-US" sz="1800" dirty="0" err="1"/>
+              <a:t>omni</a:t>
+            </a:r>
+            <a:r>
+              <a:rPr lang="en-US" sz="1800" dirty="0"/>
+              <a:t> -a https://</a:t>
+            </a:r>
+            <a:r>
+              <a:rPr lang="en-US" sz="1800" dirty="0" smtClean="0"/>
+              <a:t>137.222.204.27:5001/xmlrpc/geni/3</a:t>
+            </a:r>
+            <a:r>
+              <a:rPr lang="en-US" sz="1800" dirty="0"/>
+              <a:t>/ -V3 allocate &lt;SLICENAME&gt; </a:t>
+            </a:r>
+            <a:r>
+              <a:rPr lang="en-US" sz="1800" dirty="0" smtClean="0"/>
+              <a:t>vtam_geni3_request_i2cat.rspec</a:t>
+            </a:r>
+            <a:endParaRPr lang="en-US" sz="1800" dirty="0"/>
+          </a:p>
+          <a:p>
+            <a:pPr marL="265176" lvl="1" indent="-265176">
+              <a:buSzPct val="80000"/>
+              <a:buFont typeface="Wingdings 2"/>
+              <a:buChar char=""/>
+            </a:pPr>
+            <a:r>
+              <a:rPr lang="en-US" sz="2500" dirty="0" smtClean="0"/>
+              <a:t>Provision </a:t>
+            </a:r>
+            <a:r>
+              <a:rPr lang="en-US" sz="2500" dirty="0"/>
+              <a:t>it!</a:t>
+            </a:r>
+          </a:p>
+          <a:p>
+            <a:pPr marL="502920" lvl="2" indent="-265176">
+              <a:buSzPct val="80000"/>
+              <a:buFont typeface="Wingdings 2"/>
+              <a:buChar char=""/>
+            </a:pPr>
+            <a:r>
+              <a:rPr lang="en-US" sz="1800" dirty="0" err="1"/>
+              <a:t>omni</a:t>
+            </a:r>
+            <a:r>
+              <a:rPr lang="en-US" sz="1800" dirty="0"/>
+              <a:t> -a https://</a:t>
+            </a:r>
+            <a:r>
+              <a:rPr lang="en-US" sz="1800" dirty="0" smtClean="0"/>
+              <a:t>137.222.204.27:5001/xmlrpc/geni/3</a:t>
+            </a:r>
+            <a:r>
+              <a:rPr lang="en-US" sz="1800" dirty="0"/>
+              <a:t>/ -V3 provision &lt;SLICENAME&gt;</a:t>
+            </a:r>
+          </a:p>
+          <a:p>
+            <a:pPr marL="265176" lvl="1" indent="-265176">
+              <a:buSzPct val="80000"/>
+              <a:buFont typeface="Wingdings 2"/>
+              <a:buChar char=""/>
+            </a:pPr>
+            <a:r>
+              <a:rPr lang="en-US" sz="2500" dirty="0" err="1">
+                <a:sym typeface="Wingdings" panose="05000000000000000000" pitchFamily="2" charset="2"/>
+              </a:rPr>
+              <a:t>RSpec</a:t>
+            </a:r>
+            <a:r>
+              <a:rPr lang="en-US" sz="2500" dirty="0">
+                <a:sym typeface="Wingdings" panose="05000000000000000000" pitchFamily="2" charset="2"/>
+              </a:rPr>
+              <a:t>:</a:t>
+            </a:r>
+          </a:p>
+          <a:p>
+            <a:pPr marL="0" lvl="1" indent="0">
+              <a:buSzPct val="80000"/>
+              <a:buNone/>
+            </a:pPr>
+            <a:r>
+              <a:rPr lang="en-US" sz="1900" dirty="0" smtClean="0"/>
+              <a:t>&lt;?</a:t>
+            </a:r>
+            <a:r>
+              <a:rPr lang="en-US" sz="1900" dirty="0"/>
+              <a:t>xml version="1.0" encoding="UTF-8" standalone="yes"?&gt;</a:t>
+            </a:r>
+          </a:p>
+          <a:p>
+            <a:pPr marL="0" lvl="1" indent="0">
+              <a:buSzPct val="80000"/>
+              <a:buNone/>
+            </a:pPr>
+            <a:r>
+              <a:rPr lang="en-US" sz="1900" dirty="0"/>
+              <a:t>&lt;</a:t>
+            </a:r>
+            <a:r>
+              <a:rPr lang="en-US" sz="1900" dirty="0" err="1"/>
+              <a:t>rspec</a:t>
+            </a:r>
+            <a:r>
+              <a:rPr lang="en-US" sz="1900" dirty="0"/>
+              <a:t> generated="2014-03-22T01:53:21.460+01:00" </a:t>
+            </a:r>
+            <a:r>
+              <a:rPr lang="en-US" sz="1900" dirty="0" smtClean="0"/>
+              <a:t>type</a:t>
+            </a:r>
+            <a:r>
+              <a:rPr lang="en-US" sz="1900" dirty="0"/>
+              <a:t>="</a:t>
+            </a:r>
+            <a:r>
+              <a:rPr lang="en-US" sz="1900" dirty="0" smtClean="0"/>
+              <a:t>request“ </a:t>
+            </a:r>
+            <a:r>
+              <a:rPr lang="en-US" sz="1900" dirty="0" err="1" smtClean="0"/>
+              <a:t>xsi:schemaLocation</a:t>
+            </a:r>
+            <a:r>
+              <a:rPr lang="en-US" sz="1900" dirty="0"/>
+              <a:t>="http://www.geni.net/resources/rspec/3 http://www.geni.net/resources/rspec/3/request.xsd" </a:t>
+            </a:r>
+            <a:r>
+              <a:rPr lang="en-US" sz="1900" dirty="0" err="1"/>
+              <a:t>xmlns</a:t>
+            </a:r>
+            <a:r>
+              <a:rPr lang="en-US" sz="1900" dirty="0"/>
+              <a:t>="http://www.geni.net/resources/rspec/3" </a:t>
+            </a:r>
+            <a:r>
+              <a:rPr lang="en-US" sz="1900" dirty="0" smtClean="0"/>
+              <a:t>" " </a:t>
+            </a:r>
+            <a:r>
+              <a:rPr lang="en-US" sz="1900" dirty="0" err="1"/>
+              <a:t>xmlns:xsi</a:t>
+            </a:r>
+            <a:r>
+              <a:rPr lang="en-US" sz="1900" dirty="0"/>
+              <a:t>="http://www.w3.org/2001/XMLSchema-instance</a:t>
+            </a:r>
+            <a:r>
+              <a:rPr lang="en-US" sz="1900" dirty="0" smtClean="0"/>
+              <a:t>"</a:t>
+            </a:r>
+            <a:r>
+              <a:rPr lang="en-US" sz="1900" dirty="0" smtClean="0">
+                <a:solidFill>
+                  <a:srgbClr val="FF0000"/>
+                </a:solidFill>
+              </a:rPr>
+              <a:t>&gt;</a:t>
+            </a:r>
+            <a:endParaRPr lang="en-US" sz="1900" dirty="0">
+              <a:solidFill>
+                <a:srgbClr val="FF0000"/>
+              </a:solidFill>
+            </a:endParaRPr>
+          </a:p>
+          <a:p>
+            <a:pPr marL="0" lvl="1" indent="0">
+              <a:buSzPct val="80000"/>
+              <a:buNone/>
+            </a:pPr>
+            <a:r>
+              <a:rPr lang="en-US" sz="1900" dirty="0"/>
+              <a:t>  &lt;node </a:t>
+            </a:r>
+            <a:r>
+              <a:rPr lang="en-US" sz="1900" dirty="0" err="1"/>
+              <a:t>client_id</a:t>
+            </a:r>
+            <a:r>
+              <a:rPr lang="en-US" sz="1900" dirty="0"/>
+              <a:t>="</a:t>
+            </a:r>
+            <a:r>
+              <a:rPr lang="en-US" sz="1900" dirty="0" err="1"/>
+              <a:t>Verdaguer</a:t>
+            </a:r>
+            <a:r>
+              <a:rPr lang="en-US" sz="1900" dirty="0"/>
+              <a:t>" </a:t>
+            </a:r>
+            <a:r>
+              <a:rPr lang="en-US" sz="1900" dirty="0" err="1"/>
+              <a:t>component_id</a:t>
+            </a:r>
+            <a:r>
+              <a:rPr lang="en-US" sz="1900" dirty="0"/>
+              <a:t>="urn:publicid:IDN+ocf:i2cat:vtam+node+Verdaguer" </a:t>
+            </a:r>
+            <a:r>
+              <a:rPr lang="en-US" sz="1900" dirty="0" err="1"/>
+              <a:t>component_manager_id</a:t>
+            </a:r>
+            <a:r>
+              <a:rPr lang="en-US" sz="1900" dirty="0"/>
+              <a:t>="urn:publicid:IDN+ocf:i2cat:vtam+authority+cm" exclusive="true"&gt;</a:t>
+            </a:r>
+          </a:p>
+          <a:p>
+            <a:pPr marL="0" lvl="1" indent="0">
+              <a:buSzPct val="80000"/>
+              <a:buNone/>
+            </a:pPr>
+            <a:r>
+              <a:rPr lang="en-US" sz="1900" dirty="0" smtClean="0"/>
+              <a:t>&lt;/</a:t>
+            </a:r>
+            <a:r>
+              <a:rPr lang="en-US" sz="1900" dirty="0"/>
+              <a:t>node&gt;</a:t>
+            </a:r>
+          </a:p>
+          <a:p>
+            <a:pPr marL="0" lvl="1" indent="0">
+              <a:buSzPct val="80000"/>
+              <a:buNone/>
+            </a:pPr>
+            <a:r>
+              <a:rPr lang="en-US" sz="1900" dirty="0"/>
+              <a:t>&lt;/</a:t>
+            </a:r>
+            <a:r>
+              <a:rPr lang="en-US" sz="1900" dirty="0" err="1"/>
+              <a:t>rspec</a:t>
+            </a:r>
+            <a:r>
+              <a:rPr lang="en-US" sz="1900" dirty="0"/>
+              <a:t>&gt;</a:t>
+            </a:r>
+          </a:p>
+        </p:txBody>
+      </p:sp>
+    </p:spTree>
+    <p:extLst>
+      <p:ext uri="{BB962C8B-B14F-4D97-AF65-F5344CB8AC3E}">
+        <p14:creationId xmlns:p14="http://schemas.microsoft.com/office/powerpoint/2010/main" val="1788252524"/>
+      </p:ext>
+    </p:extLst>
+  </p:cSld>
+  <p:clrMapOvr>
+    <a:masterClrMapping/>
+  </p:clrMapOvr>
+</p:sld>
+</file>
+
+<file path=ppt/slides/slide37.xml><?xml version="1.0" encoding="utf-8"?>
+<p:sld xmlns:a="http://schemas.openxmlformats.org/drawingml/2006/main" xmlns:r="http://schemas.openxmlformats.org/officeDocument/2006/relationships" xmlns:p="http://schemas.openxmlformats.org/presentationml/2006/main">
+  <p:cSld>
+    <p:spTree>
+      <p:nvGrpSpPr>
+        <p:cNvPr id="1" name=""/>
+        <p:cNvGrpSpPr/>
+        <p:nvPr/>
+      </p:nvGrpSpPr>
+      <p:grpSpPr>
+        <a:xfrm>
+          <a:off x="0" y="0"/>
+          <a:ext cx="0" cy="0"/>
+          <a:chOff x="0" y="0"/>
+          <a:chExt cx="0" cy="0"/>
+        </a:xfrm>
+      </p:grpSpPr>
+      <p:sp>
+        <p:nvSpPr>
+          <p:cNvPr id="2" name="Títol 1"/>
+          <p:cNvSpPr>
+            <a:spLocks noGrp="1"/>
+          </p:cNvSpPr>
+          <p:nvPr>
+            <p:ph type="title"/>
+          </p:nvPr>
+        </p:nvSpPr>
+        <p:spPr/>
+        <p:txBody>
+          <a:bodyPr>
+            <a:normAutofit fontScale="90000"/>
+          </a:bodyPr>
+          <a:lstStyle/>
+          <a:p>
+            <a:r>
+              <a:rPr lang="en-US" dirty="0" smtClean="0"/>
+              <a:t>Requesting OFAM Resources (GeniV3) </a:t>
+            </a:r>
+            <a:endParaRPr lang="en-US" dirty="0"/>
+          </a:p>
+        </p:txBody>
+      </p:sp>
+      <p:sp>
+        <p:nvSpPr>
+          <p:cNvPr id="3" name="Contenidor de contingut 2"/>
+          <p:cNvSpPr>
+            <a:spLocks noGrp="1"/>
+          </p:cNvSpPr>
+          <p:nvPr>
+            <p:ph idx="1"/>
+          </p:nvPr>
+        </p:nvSpPr>
+        <p:spPr/>
+        <p:txBody>
+          <a:bodyPr/>
+          <a:lstStyle/>
+          <a:p>
+            <a:pPr marL="265176" lvl="1" indent="-265176">
+              <a:buSzPct val="80000"/>
+              <a:buFont typeface="Wingdings 2"/>
+              <a:buChar char=""/>
+            </a:pPr>
+            <a:r>
+              <a:rPr lang="en-US" sz="2500" dirty="0" smtClean="0"/>
+              <a:t>Allocate it First!</a:t>
+            </a:r>
+          </a:p>
+          <a:p>
+            <a:pPr marL="502920" lvl="2" indent="-265176">
+              <a:buSzPct val="80000"/>
+              <a:buFont typeface="Wingdings 2"/>
+              <a:buChar char=""/>
+            </a:pPr>
+            <a:r>
+              <a:rPr lang="en-US" sz="1800" dirty="0" err="1" smtClean="0"/>
+              <a:t>omni</a:t>
+            </a:r>
+            <a:r>
+              <a:rPr lang="en-US" sz="1800" dirty="0" smtClean="0"/>
+              <a:t> </a:t>
+            </a:r>
+            <a:r>
+              <a:rPr lang="en-US" sz="1800" dirty="0"/>
+              <a:t>-a https://</a:t>
+            </a:r>
+            <a:r>
+              <a:rPr lang="en-US" sz="1800" dirty="0" smtClean="0"/>
+              <a:t>137.222.204.27:5005/xmlrpc/geni/3/ -V3 allocate </a:t>
+            </a:r>
+            <a:r>
+              <a:rPr lang="en-US" sz="1800" dirty="0"/>
+              <a:t>&lt;SLICENAME&gt; </a:t>
+            </a:r>
+            <a:r>
+              <a:rPr lang="en-US" sz="1800" dirty="0" smtClean="0"/>
+              <a:t>ofam_request_i2cat.rspec</a:t>
+            </a:r>
+          </a:p>
+          <a:p>
+            <a:pPr marL="265176" lvl="1" indent="-265176">
+              <a:buSzPct val="80000"/>
+              <a:buFont typeface="Wingdings 2"/>
+              <a:buChar char=""/>
+            </a:pPr>
+            <a:r>
+              <a:rPr lang="en-US" sz="2500" dirty="0" smtClean="0"/>
+              <a:t>Provision it!</a:t>
+            </a:r>
+          </a:p>
+          <a:p>
+            <a:pPr marL="502920" lvl="2" indent="-265176">
+              <a:buSzPct val="80000"/>
+              <a:buFont typeface="Wingdings 2"/>
+              <a:buChar char=""/>
+            </a:pPr>
+            <a:r>
+              <a:rPr lang="en-US" sz="1800" dirty="0" err="1"/>
+              <a:t>omni</a:t>
+            </a:r>
+            <a:r>
+              <a:rPr lang="en-US" sz="1800" dirty="0"/>
+              <a:t> -a https://137.222.204.27:5005/xmlrpc/geni/3/ -V3 </a:t>
+            </a:r>
+            <a:r>
+              <a:rPr lang="en-US" sz="1800" dirty="0" smtClean="0"/>
+              <a:t>provision </a:t>
+            </a:r>
+            <a:r>
+              <a:rPr lang="en-US" sz="1800" dirty="0"/>
+              <a:t>&lt;SLICENAME</a:t>
+            </a:r>
+            <a:r>
+              <a:rPr lang="en-US" sz="1800" dirty="0" smtClean="0"/>
+              <a:t>&gt;</a:t>
+            </a:r>
+          </a:p>
+          <a:p>
+            <a:pPr marL="0" lvl="1" indent="0">
+              <a:buSzPct val="80000"/>
+              <a:buNone/>
+            </a:pPr>
+            <a:r>
+              <a:rPr lang="en-US" sz="2500" dirty="0" smtClean="0"/>
+              <a:t>Then wait for approval </a:t>
+            </a:r>
+            <a:r>
+              <a:rPr lang="en-US" sz="2500" dirty="0" smtClean="0">
+                <a:sym typeface="Wingdings" panose="05000000000000000000" pitchFamily="2" charset="2"/>
+              </a:rPr>
+              <a:t></a:t>
+            </a:r>
+            <a:endParaRPr lang="en-US" sz="2500" dirty="0"/>
+          </a:p>
+          <a:p>
+            <a:endParaRPr lang="en-US" dirty="0"/>
+          </a:p>
+        </p:txBody>
+      </p:sp>
+    </p:spTree>
+    <p:extLst>
+      <p:ext uri="{BB962C8B-B14F-4D97-AF65-F5344CB8AC3E}">
+        <p14:creationId xmlns:p14="http://schemas.microsoft.com/office/powerpoint/2010/main" val="768830089"/>
       </p:ext>
     </p:extLst>
   </p:cSld>

</xml_diff>